<commit_message>
tweaks with icons, added iconify
</commit_message>
<xml_diff>
--- a/docs/Presentation/slides.pptx
+++ b/docs/Presentation/slides.pptx
@@ -4490,9 +4490,9 @@
                 <a:tableStyleId>{5C22544A-7EE6-4342-B048-85BDC9FD1C3A}</a:tableStyleId>
               </a:tblPr>
               <a:tblGrid>
-                <a:gridCol w="800100"/>
-                <a:gridCol w="2413000"/>
-                <a:gridCol w="1879600"/>
+                <a:gridCol w="1130300"/>
+                <a:gridCol w="2273300"/>
+                <a:gridCol w="1701800"/>
               </a:tblGrid>
               <a:tr h="0">
                 <a:tc>

</xml_diff>